<commit_message>
Add UML diagrams for export command
</commit_message>
<xml_diff>
--- a/docs/diagrams/SequenceDiagramSearch.pptx
+++ b/docs/diagrams/SequenceDiagramSearch.pptx
@@ -9025,6 +9025,61 @@
           </a:p>
         </p:txBody>
       </p:sp>
+      <p:sp>
+        <p:nvSpPr>
+          <p:cNvPr id="48" name="TextBox 28">
+            <a:extLst>
+              <a:ext uri="{FF2B5EF4-FFF2-40B4-BE49-F238E27FC236}">
+                <a16:creationId xmlns:a16="http://schemas.microsoft.com/office/drawing/2014/main" id="{83979FCD-EDB7-6D4B-BC3A-729BE752BC6A}"/>
+              </a:ext>
+            </a:extLst>
+          </p:cNvPr>
+          <p:cNvSpPr txBox="1"/>
+          <p:nvPr/>
+        </p:nvSpPr>
+        <p:spPr>
+          <a:xfrm>
+            <a:off x="4961790" y="5362448"/>
+            <a:ext cx="2389051" cy="215444"/>
+          </a:xfrm>
+          <a:prstGeom prst="rect">
+            <a:avLst/>
+          </a:prstGeom>
+          <a:noFill/>
+        </p:spPr>
+        <p:txBody>
+          <a:bodyPr wrap="square" lIns="0" tIns="0" rIns="0" bIns="0" rtlCol="0">
+            <a:spAutoFit/>
+          </a:bodyPr>
+          <a:lstStyle>
+            <a:defPPr>
+              <a:defRPr lang="en-US"/>
+            </a:defPPr>
+            <a:lvl1pPr algn="r">
+              <a:defRPr sz="1400">
+                <a:solidFill>
+                  <a:srgbClr val="0070C0"/>
+                </a:solidFill>
+              </a:defRPr>
+            </a:lvl1pPr>
+          </a:lstStyle>
+          <a:p>
+            <a:pPr algn="ctr"/>
+            <a:r>
+              <a:rPr lang="en-US" dirty="0" err="1">
+                <a:latin typeface="Calibri"/>
+              </a:rPr>
+              <a:t>CommandResult</a:t>
+            </a:r>
+            <a:r>
+              <a:rPr lang="en-US" dirty="0">
+                <a:latin typeface="Calibri"/>
+              </a:rPr>
+              <a:t>(feedback)</a:t>
+            </a:r>
+          </a:p>
+        </p:txBody>
+      </p:sp>
     </p:spTree>
     <p:extLst>
       <p:ext uri="{BB962C8B-B14F-4D97-AF65-F5344CB8AC3E}">

</xml_diff>